<commit_message>
Added 2014 grab sample chem data from Missisquoi Bay and made matching figures
</commit_message>
<xml_diff>
--- a/03_figures/WinterN_Results_2018-06-29.pptx
+++ b/03_figures/WinterN_Results_2018-06-29.pptx
@@ -5,8 +5,10 @@
     <p:sldMasterId id="2147483648" r:id="rId1"/>
   </p:sldMasterIdLst>
   <p:sldIdLst>
-    <p:sldId id="256" r:id="rId2"/>
-    <p:sldId id="257" r:id="rId3"/>
+    <p:sldId id="258" r:id="rId2"/>
+    <p:sldId id="256" r:id="rId3"/>
+    <p:sldId id="259" r:id="rId4"/>
+    <p:sldId id="257" r:id="rId5"/>
   </p:sldIdLst>
   <p:sldSz cx="9144000" cy="6858000" type="screen4x3"/>
   <p:notesSz cx="6858000" cy="9144000"/>
@@ -289,7 +291,7 @@
           <a:p>
             <a:fld id="{229F9254-BB35-7742-B6B6-8314049D96F5}" type="datetimeFigureOut">
               <a:rPr lang="en-US" smtClean="0"/>
-              <a:t>6/29/18</a:t>
+              <a:t>7/4/18</a:t>
             </a:fld>
             <a:endParaRPr lang="en-US"/>
           </a:p>
@@ -459,7 +461,7 @@
           <a:p>
             <a:fld id="{229F9254-BB35-7742-B6B6-8314049D96F5}" type="datetimeFigureOut">
               <a:rPr lang="en-US" smtClean="0"/>
-              <a:t>6/29/18</a:t>
+              <a:t>7/4/18</a:t>
             </a:fld>
             <a:endParaRPr lang="en-US"/>
           </a:p>
@@ -639,7 +641,7 @@
           <a:p>
             <a:fld id="{229F9254-BB35-7742-B6B6-8314049D96F5}" type="datetimeFigureOut">
               <a:rPr lang="en-US" smtClean="0"/>
-              <a:t>6/29/18</a:t>
+              <a:t>7/4/18</a:t>
             </a:fld>
             <a:endParaRPr lang="en-US"/>
           </a:p>
@@ -809,7 +811,7 @@
           <a:p>
             <a:fld id="{229F9254-BB35-7742-B6B6-8314049D96F5}" type="datetimeFigureOut">
               <a:rPr lang="en-US" smtClean="0"/>
-              <a:t>6/29/18</a:t>
+              <a:t>7/4/18</a:t>
             </a:fld>
             <a:endParaRPr lang="en-US"/>
           </a:p>
@@ -1055,7 +1057,7 @@
           <a:p>
             <a:fld id="{229F9254-BB35-7742-B6B6-8314049D96F5}" type="datetimeFigureOut">
               <a:rPr lang="en-US" smtClean="0"/>
-              <a:t>6/29/18</a:t>
+              <a:t>7/4/18</a:t>
             </a:fld>
             <a:endParaRPr lang="en-US"/>
           </a:p>
@@ -1343,7 +1345,7 @@
           <a:p>
             <a:fld id="{229F9254-BB35-7742-B6B6-8314049D96F5}" type="datetimeFigureOut">
               <a:rPr lang="en-US" smtClean="0"/>
-              <a:t>6/29/18</a:t>
+              <a:t>7/4/18</a:t>
             </a:fld>
             <a:endParaRPr lang="en-US"/>
           </a:p>
@@ -1765,7 +1767,7 @@
           <a:p>
             <a:fld id="{229F9254-BB35-7742-B6B6-8314049D96F5}" type="datetimeFigureOut">
               <a:rPr lang="en-US" smtClean="0"/>
-              <a:t>6/29/18</a:t>
+              <a:t>7/4/18</a:t>
             </a:fld>
             <a:endParaRPr lang="en-US"/>
           </a:p>
@@ -1883,7 +1885,7 @@
           <a:p>
             <a:fld id="{229F9254-BB35-7742-B6B6-8314049D96F5}" type="datetimeFigureOut">
               <a:rPr lang="en-US" smtClean="0"/>
-              <a:t>6/29/18</a:t>
+              <a:t>7/4/18</a:t>
             </a:fld>
             <a:endParaRPr lang="en-US"/>
           </a:p>
@@ -1978,7 +1980,7 @@
           <a:p>
             <a:fld id="{229F9254-BB35-7742-B6B6-8314049D96F5}" type="datetimeFigureOut">
               <a:rPr lang="en-US" smtClean="0"/>
-              <a:t>6/29/18</a:t>
+              <a:t>7/4/18</a:t>
             </a:fld>
             <a:endParaRPr lang="en-US"/>
           </a:p>
@@ -2255,7 +2257,7 @@
           <a:p>
             <a:fld id="{229F9254-BB35-7742-B6B6-8314049D96F5}" type="datetimeFigureOut">
               <a:rPr lang="en-US" smtClean="0"/>
-              <a:t>6/29/18</a:t>
+              <a:t>7/4/18</a:t>
             </a:fld>
             <a:endParaRPr lang="en-US"/>
           </a:p>
@@ -2508,7 +2510,7 @@
           <a:p>
             <a:fld id="{229F9254-BB35-7742-B6B6-8314049D96F5}" type="datetimeFigureOut">
               <a:rPr lang="en-US" smtClean="0"/>
-              <a:t>6/29/18</a:t>
+              <a:t>7/4/18</a:t>
             </a:fld>
             <a:endParaRPr lang="en-US"/>
           </a:p>
@@ -2721,7 +2723,7 @@
           <a:p>
             <a:fld id="{229F9254-BB35-7742-B6B6-8314049D96F5}" type="datetimeFigureOut">
               <a:rPr lang="en-US" smtClean="0"/>
-              <a:t>6/29/18</a:t>
+              <a:t>7/4/18</a:t>
             </a:fld>
             <a:endParaRPr lang="en-US"/>
           </a:p>
@@ -3098,6 +3100,476 @@
       </p:grpSpPr>
       <p:pic>
         <p:nvPicPr>
+          <p:cNvPr id="2" name="Picture 1" descr="2015_winterN_profiles_mp.png"/>
+          <p:cNvPicPr>
+            <a:picLocks noChangeAspect="1"/>
+          </p:cNvPicPr>
+          <p:nvPr/>
+        </p:nvPicPr>
+        <p:blipFill>
+          <a:blip r:embed="rId2">
+            <a:extLst>
+              <a:ext uri="{28A0092B-C50C-407E-A947-70E740481C1C}">
+                <a14:useLocalDpi xmlns:a14="http://schemas.microsoft.com/office/drawing/2010/main" val="0"/>
+              </a:ext>
+            </a:extLst>
+          </a:blip>
+          <a:stretch>
+            <a:fillRect/>
+          </a:stretch>
+        </p:blipFill>
+        <p:spPr>
+          <a:xfrm>
+            <a:off x="0" y="3869452"/>
+            <a:ext cx="9144000" cy="2743200"/>
+          </a:xfrm>
+          <a:prstGeom prst="rect">
+            <a:avLst/>
+          </a:prstGeom>
+        </p:spPr>
+      </p:pic>
+      <p:cxnSp>
+        <p:nvCxnSpPr>
+          <p:cNvPr id="3" name="Straight Connector 2"/>
+          <p:cNvCxnSpPr/>
+          <p:nvPr/>
+        </p:nvCxnSpPr>
+        <p:spPr>
+          <a:xfrm>
+            <a:off x="6350000" y="3798332"/>
+            <a:ext cx="0" cy="2712720"/>
+          </a:xfrm>
+          <a:prstGeom prst="line">
+            <a:avLst/>
+          </a:prstGeom>
+          <a:ln w="31750">
+            <a:solidFill>
+              <a:schemeClr val="tx1"/>
+            </a:solidFill>
+            <a:prstDash val="dash"/>
+          </a:ln>
+        </p:spPr>
+        <p:style>
+          <a:lnRef idx="2">
+            <a:schemeClr val="accent1"/>
+          </a:lnRef>
+          <a:fillRef idx="0">
+            <a:schemeClr val="accent1"/>
+          </a:fillRef>
+          <a:effectRef idx="1">
+            <a:schemeClr val="accent1"/>
+          </a:effectRef>
+          <a:fontRef idx="minor">
+            <a:schemeClr val="tx1"/>
+          </a:fontRef>
+        </p:style>
+      </p:cxnSp>
+      <p:cxnSp>
+        <p:nvCxnSpPr>
+          <p:cNvPr id="4" name="Straight Connector 3"/>
+          <p:cNvCxnSpPr/>
+          <p:nvPr/>
+        </p:nvCxnSpPr>
+        <p:spPr>
+          <a:xfrm>
+            <a:off x="4348480" y="3798332"/>
+            <a:ext cx="0" cy="2712720"/>
+          </a:xfrm>
+          <a:prstGeom prst="line">
+            <a:avLst/>
+          </a:prstGeom>
+          <a:ln w="31750">
+            <a:solidFill>
+              <a:schemeClr val="tx1"/>
+            </a:solidFill>
+            <a:prstDash val="dash"/>
+          </a:ln>
+        </p:spPr>
+        <p:style>
+          <a:lnRef idx="2">
+            <a:schemeClr val="accent1"/>
+          </a:lnRef>
+          <a:fillRef idx="0">
+            <a:schemeClr val="accent1"/>
+          </a:fillRef>
+          <a:effectRef idx="1">
+            <a:schemeClr val="accent1"/>
+          </a:effectRef>
+          <a:fontRef idx="minor">
+            <a:schemeClr val="tx1"/>
+          </a:fontRef>
+        </p:style>
+      </p:cxnSp>
+      <p:cxnSp>
+        <p:nvCxnSpPr>
+          <p:cNvPr id="5" name="Straight Connector 4"/>
+          <p:cNvCxnSpPr/>
+          <p:nvPr/>
+        </p:nvCxnSpPr>
+        <p:spPr>
+          <a:xfrm>
+            <a:off x="7345680" y="3798332"/>
+            <a:ext cx="0" cy="2712720"/>
+          </a:xfrm>
+          <a:prstGeom prst="line">
+            <a:avLst/>
+          </a:prstGeom>
+          <a:ln w="31750">
+            <a:solidFill>
+              <a:schemeClr val="tx1"/>
+            </a:solidFill>
+            <a:prstDash val="dash"/>
+          </a:ln>
+        </p:spPr>
+        <p:style>
+          <a:lnRef idx="2">
+            <a:schemeClr val="accent1"/>
+          </a:lnRef>
+          <a:fillRef idx="0">
+            <a:schemeClr val="accent1"/>
+          </a:fillRef>
+          <a:effectRef idx="1">
+            <a:schemeClr val="accent1"/>
+          </a:effectRef>
+          <a:fontRef idx="minor">
+            <a:schemeClr val="tx1"/>
+          </a:fontRef>
+        </p:style>
+      </p:cxnSp>
+      <p:sp>
+        <p:nvSpPr>
+          <p:cNvPr id="6" name="TextBox 5"/>
+          <p:cNvSpPr txBox="1"/>
+          <p:nvPr/>
+        </p:nvSpPr>
+        <p:spPr>
+          <a:xfrm>
+            <a:off x="2052320" y="3429000"/>
+            <a:ext cx="820244" cy="369332"/>
+          </a:xfrm>
+          <a:prstGeom prst="rect">
+            <a:avLst/>
+          </a:prstGeom>
+          <a:noFill/>
+        </p:spPr>
+        <p:txBody>
+          <a:bodyPr wrap="none" rtlCol="0">
+            <a:spAutoFit/>
+          </a:bodyPr>
+          <a:lstStyle/>
+          <a:p>
+            <a:r>
+              <a:rPr lang="en-US" dirty="0" smtClean="0"/>
+              <a:t>Frozen</a:t>
+            </a:r>
+            <a:endParaRPr lang="en-US" dirty="0"/>
+          </a:p>
+        </p:txBody>
+      </p:sp>
+      <p:sp>
+        <p:nvSpPr>
+          <p:cNvPr id="7" name="TextBox 6"/>
+          <p:cNvSpPr txBox="1"/>
+          <p:nvPr/>
+        </p:nvSpPr>
+        <p:spPr>
+          <a:xfrm>
+            <a:off x="5939878" y="3429000"/>
+            <a:ext cx="694008" cy="369332"/>
+          </a:xfrm>
+          <a:prstGeom prst="rect">
+            <a:avLst/>
+          </a:prstGeom>
+          <a:noFill/>
+        </p:spPr>
+        <p:txBody>
+          <a:bodyPr wrap="none" rtlCol="0">
+            <a:spAutoFit/>
+          </a:bodyPr>
+          <a:lstStyle/>
+          <a:p>
+            <a:r>
+              <a:rPr lang="en-US" dirty="0" smtClean="0"/>
+              <a:t>Thaw</a:t>
+            </a:r>
+            <a:endParaRPr lang="en-US" dirty="0"/>
+          </a:p>
+        </p:txBody>
+      </p:sp>
+      <p:cxnSp>
+        <p:nvCxnSpPr>
+          <p:cNvPr id="8" name="Straight Arrow Connector 7"/>
+          <p:cNvCxnSpPr>
+            <a:stCxn id="7" idx="1"/>
+          </p:cNvCxnSpPr>
+          <p:nvPr/>
+        </p:nvCxnSpPr>
+        <p:spPr>
+          <a:xfrm flipH="1">
+            <a:off x="4348480" y="3613666"/>
+            <a:ext cx="1591398" cy="1786"/>
+          </a:xfrm>
+          <a:prstGeom prst="straightConnector1">
+            <a:avLst/>
+          </a:prstGeom>
+          <a:ln>
+            <a:tailEnd type="arrow"/>
+          </a:ln>
+        </p:spPr>
+        <p:style>
+          <a:lnRef idx="2">
+            <a:schemeClr val="accent1"/>
+          </a:lnRef>
+          <a:fillRef idx="0">
+            <a:schemeClr val="accent1"/>
+          </a:fillRef>
+          <a:effectRef idx="1">
+            <a:schemeClr val="accent1"/>
+          </a:effectRef>
+          <a:fontRef idx="minor">
+            <a:schemeClr val="tx1"/>
+          </a:fontRef>
+        </p:style>
+      </p:cxnSp>
+      <p:cxnSp>
+        <p:nvCxnSpPr>
+          <p:cNvPr id="9" name="Straight Arrow Connector 8"/>
+          <p:cNvCxnSpPr/>
+          <p:nvPr/>
+        </p:nvCxnSpPr>
+        <p:spPr>
+          <a:xfrm>
+            <a:off x="6633886" y="3615452"/>
+            <a:ext cx="711794" cy="0"/>
+          </a:xfrm>
+          <a:prstGeom prst="straightConnector1">
+            <a:avLst/>
+          </a:prstGeom>
+          <a:ln>
+            <a:tailEnd type="arrow"/>
+          </a:ln>
+        </p:spPr>
+        <p:style>
+          <a:lnRef idx="2">
+            <a:schemeClr val="accent1"/>
+          </a:lnRef>
+          <a:fillRef idx="0">
+            <a:schemeClr val="accent1"/>
+          </a:fillRef>
+          <a:effectRef idx="1">
+            <a:schemeClr val="accent1"/>
+          </a:effectRef>
+          <a:fontRef idx="minor">
+            <a:schemeClr val="tx1"/>
+          </a:fontRef>
+        </p:style>
+      </p:cxnSp>
+      <p:cxnSp>
+        <p:nvCxnSpPr>
+          <p:cNvPr id="10" name="Straight Arrow Connector 9"/>
+          <p:cNvCxnSpPr/>
+          <p:nvPr/>
+        </p:nvCxnSpPr>
+        <p:spPr>
+          <a:xfrm flipH="1">
+            <a:off x="464181" y="3623826"/>
+            <a:ext cx="1591398" cy="0"/>
+          </a:xfrm>
+          <a:prstGeom prst="straightConnector1">
+            <a:avLst/>
+          </a:prstGeom>
+          <a:ln>
+            <a:tailEnd type="arrow"/>
+          </a:ln>
+        </p:spPr>
+        <p:style>
+          <a:lnRef idx="2">
+            <a:schemeClr val="accent1"/>
+          </a:lnRef>
+          <a:fillRef idx="0">
+            <a:schemeClr val="accent1"/>
+          </a:fillRef>
+          <a:effectRef idx="1">
+            <a:schemeClr val="accent1"/>
+          </a:effectRef>
+          <a:fontRef idx="minor">
+            <a:schemeClr val="tx1"/>
+          </a:fontRef>
+        </p:style>
+      </p:cxnSp>
+      <p:cxnSp>
+        <p:nvCxnSpPr>
+          <p:cNvPr id="11" name="Straight Arrow Connector 10"/>
+          <p:cNvCxnSpPr/>
+          <p:nvPr/>
+        </p:nvCxnSpPr>
+        <p:spPr>
+          <a:xfrm>
+            <a:off x="2872564" y="3615452"/>
+            <a:ext cx="1475916" cy="0"/>
+          </a:xfrm>
+          <a:prstGeom prst="straightConnector1">
+            <a:avLst/>
+          </a:prstGeom>
+          <a:ln>
+            <a:tailEnd type="arrow"/>
+          </a:ln>
+        </p:spPr>
+        <p:style>
+          <a:lnRef idx="2">
+            <a:schemeClr val="accent1"/>
+          </a:lnRef>
+          <a:fillRef idx="0">
+            <a:schemeClr val="accent1"/>
+          </a:fillRef>
+          <a:effectRef idx="1">
+            <a:schemeClr val="accent1"/>
+          </a:effectRef>
+          <a:fontRef idx="minor">
+            <a:schemeClr val="tx1"/>
+          </a:fontRef>
+        </p:style>
+      </p:cxnSp>
+      <p:pic>
+        <p:nvPicPr>
+          <p:cNvPr id="12" name="Picture 11" descr="2014_winterN_profiles_mp.png"/>
+          <p:cNvPicPr>
+            <a:picLocks noChangeAspect="1"/>
+          </p:cNvPicPr>
+          <p:nvPr/>
+        </p:nvPicPr>
+        <p:blipFill>
+          <a:blip r:embed="rId3">
+            <a:extLst>
+              <a:ext uri="{28A0092B-C50C-407E-A947-70E740481C1C}">
+                <a14:useLocalDpi xmlns:a14="http://schemas.microsoft.com/office/drawing/2010/main" val="0"/>
+              </a:ext>
+            </a:extLst>
+          </a:blip>
+          <a:stretch>
+            <a:fillRect/>
+          </a:stretch>
+        </p:blipFill>
+        <p:spPr>
+          <a:xfrm>
+            <a:off x="37719" y="774152"/>
+            <a:ext cx="7958959" cy="2743200"/>
+          </a:xfrm>
+          <a:prstGeom prst="rect">
+            <a:avLst/>
+          </a:prstGeom>
+        </p:spPr>
+      </p:pic>
+      <p:sp>
+        <p:nvSpPr>
+          <p:cNvPr id="13" name="TextBox 12"/>
+          <p:cNvSpPr txBox="1"/>
+          <p:nvPr/>
+        </p:nvSpPr>
+        <p:spPr>
+          <a:xfrm>
+            <a:off x="0" y="118348"/>
+            <a:ext cx="5872183" cy="369332"/>
+          </a:xfrm>
+          <a:prstGeom prst="rect">
+            <a:avLst/>
+          </a:prstGeom>
+          <a:noFill/>
+        </p:spPr>
+        <p:txBody>
+          <a:bodyPr wrap="none" rtlCol="0">
+            <a:spAutoFit/>
+          </a:bodyPr>
+          <a:lstStyle/>
+          <a:p>
+            <a:r>
+              <a:rPr lang="en-US" dirty="0" err="1" smtClean="0"/>
+              <a:t>Missisquoi</a:t>
+            </a:r>
+            <a:r>
+              <a:rPr lang="en-US" dirty="0" smtClean="0"/>
+              <a:t> Bay </a:t>
+            </a:r>
+            <a:r>
+              <a:rPr lang="mr-IN" dirty="0" smtClean="0"/>
+              <a:t>–</a:t>
+            </a:r>
+            <a:r>
+              <a:rPr lang="en-US" dirty="0" smtClean="0"/>
+              <a:t> Winter 2014 &amp; 2015 Comparison - Nitrogen</a:t>
+            </a:r>
+            <a:endParaRPr lang="en-US" dirty="0"/>
+          </a:p>
+        </p:txBody>
+      </p:sp>
+      <p:cxnSp>
+        <p:nvCxnSpPr>
+          <p:cNvPr id="14" name="Straight Connector 13"/>
+          <p:cNvCxnSpPr/>
+          <p:nvPr/>
+        </p:nvCxnSpPr>
+        <p:spPr>
+          <a:xfrm>
+            <a:off x="5318151" y="698702"/>
+            <a:ext cx="0" cy="2712720"/>
+          </a:xfrm>
+          <a:prstGeom prst="line">
+            <a:avLst/>
+          </a:prstGeom>
+          <a:ln w="31750">
+            <a:solidFill>
+              <a:schemeClr val="tx1"/>
+            </a:solidFill>
+            <a:prstDash val="dash"/>
+          </a:ln>
+        </p:spPr>
+        <p:style>
+          <a:lnRef idx="2">
+            <a:schemeClr val="accent1"/>
+          </a:lnRef>
+          <a:fillRef idx="0">
+            <a:schemeClr val="accent1"/>
+          </a:fillRef>
+          <a:effectRef idx="1">
+            <a:schemeClr val="accent1"/>
+          </a:effectRef>
+          <a:fontRef idx="minor">
+            <a:schemeClr val="tx1"/>
+          </a:fontRef>
+        </p:style>
+      </p:cxnSp>
+    </p:spTree>
+    <p:extLst>
+      <p:ext uri="{BB962C8B-B14F-4D97-AF65-F5344CB8AC3E}">
+        <p14:creationId xmlns:p14="http://schemas.microsoft.com/office/powerpoint/2010/main" val="3228311329"/>
+      </p:ext>
+    </p:extLst>
+  </p:cSld>
+  <p:clrMapOvr>
+    <a:masterClrMapping/>
+  </p:clrMapOvr>
+</p:sld>
+</file>
+
+<file path=ppt/slides/slide2.xml><?xml version="1.0" encoding="utf-8"?>
+<p:sld xmlns:a="http://schemas.openxmlformats.org/drawingml/2006/main" xmlns:r="http://schemas.openxmlformats.org/officeDocument/2006/relationships" xmlns:p="http://schemas.openxmlformats.org/presentationml/2006/main">
+  <p:cSld>
+    <p:spTree>
+      <p:nvGrpSpPr>
+        <p:cNvPr id="1" name=""/>
+        <p:cNvGrpSpPr/>
+        <p:nvPr/>
+      </p:nvGrpSpPr>
+      <p:grpSpPr>
+        <a:xfrm>
+          <a:off x="0" y="0"/>
+          <a:ext cx="0" cy="0"/>
+          <a:chOff x="0" y="0"/>
+          <a:chExt cx="0" cy="0"/>
+        </a:xfrm>
+      </p:grpSpPr>
+      <p:pic>
+        <p:nvPicPr>
           <p:cNvPr id="8" name="Picture 7" descr="2015_winterN_profiles_mp.png"/>
           <p:cNvPicPr>
             <a:picLocks noChangeAspect="1"/>
@@ -3543,7 +4015,231 @@
 </p:sld>
 </file>
 
-<file path=ppt/slides/slide2.xml><?xml version="1.0" encoding="utf-8"?>
+<file path=ppt/slides/slide3.xml><?xml version="1.0" encoding="utf-8"?>
+<p:sld xmlns:a="http://schemas.openxmlformats.org/drawingml/2006/main" xmlns:r="http://schemas.openxmlformats.org/officeDocument/2006/relationships" xmlns:p="http://schemas.openxmlformats.org/presentationml/2006/main">
+  <p:cSld>
+    <p:spTree>
+      <p:nvGrpSpPr>
+        <p:cNvPr id="1" name=""/>
+        <p:cNvGrpSpPr/>
+        <p:nvPr/>
+      </p:nvGrpSpPr>
+      <p:grpSpPr>
+        <a:xfrm>
+          <a:off x="0" y="0"/>
+          <a:ext cx="0" cy="0"/>
+          <a:chOff x="0" y="0"/>
+          <a:chExt cx="0" cy="0"/>
+        </a:xfrm>
+      </p:grpSpPr>
+      <p:sp>
+        <p:nvSpPr>
+          <p:cNvPr id="3" name="TextBox 2"/>
+          <p:cNvSpPr txBox="1"/>
+          <p:nvPr/>
+        </p:nvSpPr>
+        <p:spPr>
+          <a:xfrm>
+            <a:off x="1584960" y="626348"/>
+            <a:ext cx="1625600" cy="369332"/>
+          </a:xfrm>
+          <a:prstGeom prst="rect">
+            <a:avLst/>
+          </a:prstGeom>
+          <a:noFill/>
+        </p:spPr>
+        <p:txBody>
+          <a:bodyPr wrap="square" rtlCol="0">
+            <a:spAutoFit/>
+          </a:bodyPr>
+          <a:lstStyle/>
+          <a:p>
+            <a:pPr algn="ctr"/>
+            <a:r>
+              <a:rPr lang="en-US" dirty="0" smtClean="0"/>
+              <a:t>2014</a:t>
+            </a:r>
+            <a:endParaRPr lang="en-US" dirty="0"/>
+          </a:p>
+        </p:txBody>
+      </p:sp>
+      <p:sp>
+        <p:nvSpPr>
+          <p:cNvPr id="4" name="TextBox 3"/>
+          <p:cNvSpPr txBox="1"/>
+          <p:nvPr/>
+        </p:nvSpPr>
+        <p:spPr>
+          <a:xfrm>
+            <a:off x="5973491" y="74089"/>
+            <a:ext cx="3079350" cy="461665"/>
+          </a:xfrm>
+          <a:prstGeom prst="rect">
+            <a:avLst/>
+          </a:prstGeom>
+          <a:noFill/>
+        </p:spPr>
+        <p:txBody>
+          <a:bodyPr wrap="square" rtlCol="0">
+            <a:spAutoFit/>
+          </a:bodyPr>
+          <a:lstStyle/>
+          <a:p>
+            <a:r>
+              <a:rPr lang="en-US" sz="1200" dirty="0" smtClean="0"/>
+              <a:t>Same data over time and grouped by depth (D1 = top, D5 = bottom)</a:t>
+            </a:r>
+            <a:endParaRPr lang="en-US" sz="1200" dirty="0"/>
+          </a:p>
+        </p:txBody>
+      </p:sp>
+      <p:sp>
+        <p:nvSpPr>
+          <p:cNvPr id="5" name="TextBox 4"/>
+          <p:cNvSpPr txBox="1"/>
+          <p:nvPr/>
+        </p:nvSpPr>
+        <p:spPr>
+          <a:xfrm>
+            <a:off x="0" y="118348"/>
+            <a:ext cx="5872183" cy="369332"/>
+          </a:xfrm>
+          <a:prstGeom prst="rect">
+            <a:avLst/>
+          </a:prstGeom>
+          <a:noFill/>
+        </p:spPr>
+        <p:txBody>
+          <a:bodyPr wrap="none" rtlCol="0">
+            <a:spAutoFit/>
+          </a:bodyPr>
+          <a:lstStyle/>
+          <a:p>
+            <a:r>
+              <a:rPr lang="en-US" dirty="0" err="1" smtClean="0"/>
+              <a:t>Missisquoi</a:t>
+            </a:r>
+            <a:r>
+              <a:rPr lang="en-US" dirty="0" smtClean="0"/>
+              <a:t> Bay </a:t>
+            </a:r>
+            <a:r>
+              <a:rPr lang="mr-IN" dirty="0" smtClean="0"/>
+              <a:t>–</a:t>
+            </a:r>
+            <a:r>
+              <a:rPr lang="en-US" dirty="0" smtClean="0"/>
+              <a:t> Winter 2014 &amp; 2015 Comparison - Nitrogen</a:t>
+            </a:r>
+            <a:endParaRPr lang="en-US" dirty="0"/>
+          </a:p>
+        </p:txBody>
+      </p:sp>
+      <p:pic>
+        <p:nvPicPr>
+          <p:cNvPr id="6" name="Picture 5" descr="2014_winterN_timeseries_mp.png"/>
+          <p:cNvPicPr>
+            <a:picLocks noChangeAspect="1"/>
+          </p:cNvPicPr>
+          <p:nvPr/>
+        </p:nvPicPr>
+        <p:blipFill>
+          <a:blip r:embed="rId2">
+            <a:extLst>
+              <a:ext uri="{28A0092B-C50C-407E-A947-70E740481C1C}">
+                <a14:useLocalDpi xmlns:a14="http://schemas.microsoft.com/office/drawing/2010/main" val="0"/>
+              </a:ext>
+            </a:extLst>
+          </a:blip>
+          <a:stretch>
+            <a:fillRect/>
+          </a:stretch>
+        </p:blipFill>
+        <p:spPr>
+          <a:xfrm>
+            <a:off x="62864" y="965200"/>
+            <a:ext cx="4910667" cy="5892800"/>
+          </a:xfrm>
+          <a:prstGeom prst="rect">
+            <a:avLst/>
+          </a:prstGeom>
+        </p:spPr>
+      </p:pic>
+      <p:pic>
+        <p:nvPicPr>
+          <p:cNvPr id="2" name="Picture 1" descr="2015_winterN_timeseries_mp.png"/>
+          <p:cNvPicPr>
+            <a:picLocks noChangeAspect="1"/>
+          </p:cNvPicPr>
+          <p:nvPr/>
+        </p:nvPicPr>
+        <p:blipFill>
+          <a:blip r:embed="rId3">
+            <a:extLst>
+              <a:ext uri="{28A0092B-C50C-407E-A947-70E740481C1C}">
+                <a14:useLocalDpi xmlns:a14="http://schemas.microsoft.com/office/drawing/2010/main" val="0"/>
+              </a:ext>
+            </a:extLst>
+          </a:blip>
+          <a:stretch>
+            <a:fillRect/>
+          </a:stretch>
+        </p:blipFill>
+        <p:spPr>
+          <a:xfrm>
+            <a:off x="4288748" y="965200"/>
+            <a:ext cx="4817533" cy="5781040"/>
+          </a:xfrm>
+          <a:prstGeom prst="rect">
+            <a:avLst/>
+          </a:prstGeom>
+        </p:spPr>
+      </p:pic>
+      <p:sp>
+        <p:nvSpPr>
+          <p:cNvPr id="7" name="TextBox 6"/>
+          <p:cNvSpPr txBox="1"/>
+          <p:nvPr/>
+        </p:nvSpPr>
+        <p:spPr>
+          <a:xfrm>
+            <a:off x="5685406" y="626348"/>
+            <a:ext cx="1625600" cy="369332"/>
+          </a:xfrm>
+          <a:prstGeom prst="rect">
+            <a:avLst/>
+          </a:prstGeom>
+          <a:noFill/>
+        </p:spPr>
+        <p:txBody>
+          <a:bodyPr wrap="square" rtlCol="0">
+            <a:spAutoFit/>
+          </a:bodyPr>
+          <a:lstStyle/>
+          <a:p>
+            <a:pPr algn="ctr"/>
+            <a:r>
+              <a:rPr lang="en-US" dirty="0" smtClean="0"/>
+              <a:t>2015</a:t>
+            </a:r>
+            <a:endParaRPr lang="en-US" dirty="0"/>
+          </a:p>
+        </p:txBody>
+      </p:sp>
+    </p:spTree>
+    <p:extLst>
+      <p:ext uri="{BB962C8B-B14F-4D97-AF65-F5344CB8AC3E}">
+        <p14:creationId xmlns:p14="http://schemas.microsoft.com/office/powerpoint/2010/main" val="2470795037"/>
+      </p:ext>
+    </p:extLst>
+  </p:cSld>
+  <p:clrMapOvr>
+    <a:masterClrMapping/>
+  </p:clrMapOvr>
+</p:sld>
+</file>
+
+<file path=ppt/slides/slide4.xml><?xml version="1.0" encoding="utf-8"?>
 <p:sld xmlns:a="http://schemas.openxmlformats.org/drawingml/2006/main" xmlns:r="http://schemas.openxmlformats.org/officeDocument/2006/relationships" xmlns:p="http://schemas.openxmlformats.org/presentationml/2006/main">
   <p:cSld>
     <p:spTree>

</xml_diff>

<commit_message>
Added supplementary data from Joung et al. paper and updating R script
</commit_message>
<xml_diff>
--- a/03_figures/WinterN_Results_2018-06-29.pptx
+++ b/03_figures/WinterN_Results_2018-06-29.pptx
@@ -4,6 +4,9 @@
   <p:sldMasterIdLst>
     <p:sldMasterId id="2147483648" r:id="rId1"/>
   </p:sldMasterIdLst>
+  <p:notesMasterIdLst>
+    <p:notesMasterId r:id="rId6"/>
+  </p:notesMasterIdLst>
   <p:sldIdLst>
     <p:sldId id="258" r:id="rId2"/>
     <p:sldId id="256" r:id="rId3"/>
@@ -107,7 +110,459 @@
       </a:defRPr>
     </a:lvl9pPr>
   </p:defaultTextStyle>
+  <p:extLst>
+    <p:ext uri="{EFAFB233-063F-42B5-8137-9DF3F51BA10A}">
+      <p15:sldGuideLst xmlns:p15="http://schemas.microsoft.com/office/powerpoint/2012/main">
+        <p15:guide id="1" orient="horz" pos="2160">
+          <p15:clr>
+            <a:srgbClr val="A4A3A4"/>
+          </p15:clr>
+        </p15:guide>
+        <p15:guide id="2" pos="2880">
+          <p15:clr>
+            <a:srgbClr val="A4A3A4"/>
+          </p15:clr>
+        </p15:guide>
+      </p15:sldGuideLst>
+    </p:ext>
+  </p:extLst>
 </p:presentation>
+</file>
+
+<file path=ppt/notesMasters/notesMaster1.xml><?xml version="1.0" encoding="utf-8"?>
+<p:notesMaster xmlns:a="http://schemas.openxmlformats.org/drawingml/2006/main" xmlns:r="http://schemas.openxmlformats.org/officeDocument/2006/relationships" xmlns:p="http://schemas.openxmlformats.org/presentationml/2006/main">
+  <p:cSld>
+    <p:bg>
+      <p:bgRef idx="1001">
+        <a:schemeClr val="bg1"/>
+      </p:bgRef>
+    </p:bg>
+    <p:spTree>
+      <p:nvGrpSpPr>
+        <p:cNvPr id="1" name=""/>
+        <p:cNvGrpSpPr/>
+        <p:nvPr/>
+      </p:nvGrpSpPr>
+      <p:grpSpPr>
+        <a:xfrm>
+          <a:off x="0" y="0"/>
+          <a:ext cx="0" cy="0"/>
+          <a:chOff x="0" y="0"/>
+          <a:chExt cx="0" cy="0"/>
+        </a:xfrm>
+      </p:grpSpPr>
+      <p:sp>
+        <p:nvSpPr>
+          <p:cNvPr id="2" name="Header Placeholder 1"/>
+          <p:cNvSpPr>
+            <a:spLocks noGrp="1"/>
+          </p:cNvSpPr>
+          <p:nvPr>
+            <p:ph type="hdr" sz="quarter"/>
+          </p:nvPr>
+        </p:nvSpPr>
+        <p:spPr>
+          <a:xfrm>
+            <a:off x="0" y="0"/>
+            <a:ext cx="2971800" cy="458788"/>
+          </a:xfrm>
+          <a:prstGeom prst="rect">
+            <a:avLst/>
+          </a:prstGeom>
+        </p:spPr>
+        <p:txBody>
+          <a:bodyPr vert="horz" lIns="91440" tIns="45720" rIns="91440" bIns="45720" rtlCol="0"/>
+          <a:lstStyle>
+            <a:lvl1pPr algn="l">
+              <a:defRPr sz="1200"/>
+            </a:lvl1pPr>
+          </a:lstStyle>
+          <a:p>
+            <a:endParaRPr lang="en-US"/>
+          </a:p>
+        </p:txBody>
+      </p:sp>
+      <p:sp>
+        <p:nvSpPr>
+          <p:cNvPr id="3" name="Date Placeholder 2"/>
+          <p:cNvSpPr>
+            <a:spLocks noGrp="1"/>
+          </p:cNvSpPr>
+          <p:nvPr>
+            <p:ph type="dt" idx="1"/>
+          </p:nvPr>
+        </p:nvSpPr>
+        <p:spPr>
+          <a:xfrm>
+            <a:off x="3884613" y="0"/>
+            <a:ext cx="2971800" cy="458788"/>
+          </a:xfrm>
+          <a:prstGeom prst="rect">
+            <a:avLst/>
+          </a:prstGeom>
+        </p:spPr>
+        <p:txBody>
+          <a:bodyPr vert="horz" lIns="91440" tIns="45720" rIns="91440" bIns="45720" rtlCol="0"/>
+          <a:lstStyle>
+            <a:lvl1pPr algn="r">
+              <a:defRPr sz="1200"/>
+            </a:lvl1pPr>
+          </a:lstStyle>
+          <a:p>
+            <a:fld id="{BC4212A3-2538-5D4F-9E25-B94620C3D71B}" type="datetimeFigureOut">
+              <a:rPr lang="en-US" smtClean="0"/>
+              <a:t>9/10/18</a:t>
+            </a:fld>
+            <a:endParaRPr lang="en-US"/>
+          </a:p>
+        </p:txBody>
+      </p:sp>
+      <p:sp>
+        <p:nvSpPr>
+          <p:cNvPr id="4" name="Slide Image Placeholder 3"/>
+          <p:cNvSpPr>
+            <a:spLocks noGrp="1" noRot="1" noChangeAspect="1"/>
+          </p:cNvSpPr>
+          <p:nvPr>
+            <p:ph type="sldImg" idx="2"/>
+          </p:nvPr>
+        </p:nvSpPr>
+        <p:spPr>
+          <a:xfrm>
+            <a:off x="1371600" y="1143000"/>
+            <a:ext cx="4114800" cy="3086100"/>
+          </a:xfrm>
+          <a:prstGeom prst="rect">
+            <a:avLst/>
+          </a:prstGeom>
+          <a:noFill/>
+          <a:ln w="12700">
+            <a:solidFill>
+              <a:prstClr val="black"/>
+            </a:solidFill>
+          </a:ln>
+        </p:spPr>
+        <p:txBody>
+          <a:bodyPr vert="horz" lIns="91440" tIns="45720" rIns="91440" bIns="45720" rtlCol="0" anchor="ctr"/>
+          <a:lstStyle/>
+          <a:p>
+            <a:endParaRPr lang="en-US"/>
+          </a:p>
+        </p:txBody>
+      </p:sp>
+      <p:sp>
+        <p:nvSpPr>
+          <p:cNvPr id="5" name="Notes Placeholder 4"/>
+          <p:cNvSpPr>
+            <a:spLocks noGrp="1"/>
+          </p:cNvSpPr>
+          <p:nvPr>
+            <p:ph type="body" sz="quarter" idx="3"/>
+          </p:nvPr>
+        </p:nvSpPr>
+        <p:spPr>
+          <a:xfrm>
+            <a:off x="685800" y="4400550"/>
+            <a:ext cx="5486400" cy="3600450"/>
+          </a:xfrm>
+          <a:prstGeom prst="rect">
+            <a:avLst/>
+          </a:prstGeom>
+        </p:spPr>
+        <p:txBody>
+          <a:bodyPr vert="horz" lIns="91440" tIns="45720" rIns="91440" bIns="45720" rtlCol="0"/>
+          <a:lstStyle/>
+          <a:p>
+            <a:pPr lvl="0"/>
+            <a:r>
+              <a:rPr lang="en-US"/>
+              <a:t>Edit Master text styles</a:t>
+            </a:r>
+          </a:p>
+          <a:p>
+            <a:pPr lvl="1"/>
+            <a:r>
+              <a:rPr lang="en-US"/>
+              <a:t>Second level</a:t>
+            </a:r>
+          </a:p>
+          <a:p>
+            <a:pPr lvl="2"/>
+            <a:r>
+              <a:rPr lang="en-US"/>
+              <a:t>Third level</a:t>
+            </a:r>
+          </a:p>
+          <a:p>
+            <a:pPr lvl="3"/>
+            <a:r>
+              <a:rPr lang="en-US"/>
+              <a:t>Fourth level</a:t>
+            </a:r>
+          </a:p>
+          <a:p>
+            <a:pPr lvl="4"/>
+            <a:r>
+              <a:rPr lang="en-US"/>
+              <a:t>Fifth level</a:t>
+            </a:r>
+          </a:p>
+        </p:txBody>
+      </p:sp>
+      <p:sp>
+        <p:nvSpPr>
+          <p:cNvPr id="6" name="Footer Placeholder 5"/>
+          <p:cNvSpPr>
+            <a:spLocks noGrp="1"/>
+          </p:cNvSpPr>
+          <p:nvPr>
+            <p:ph type="ftr" sz="quarter" idx="4"/>
+          </p:nvPr>
+        </p:nvSpPr>
+        <p:spPr>
+          <a:xfrm>
+            <a:off x="0" y="8685213"/>
+            <a:ext cx="2971800" cy="458787"/>
+          </a:xfrm>
+          <a:prstGeom prst="rect">
+            <a:avLst/>
+          </a:prstGeom>
+        </p:spPr>
+        <p:txBody>
+          <a:bodyPr vert="horz" lIns="91440" tIns="45720" rIns="91440" bIns="45720" rtlCol="0" anchor="b"/>
+          <a:lstStyle>
+            <a:lvl1pPr algn="l">
+              <a:defRPr sz="1200"/>
+            </a:lvl1pPr>
+          </a:lstStyle>
+          <a:p>
+            <a:endParaRPr lang="en-US"/>
+          </a:p>
+        </p:txBody>
+      </p:sp>
+      <p:sp>
+        <p:nvSpPr>
+          <p:cNvPr id="7" name="Slide Number Placeholder 6"/>
+          <p:cNvSpPr>
+            <a:spLocks noGrp="1"/>
+          </p:cNvSpPr>
+          <p:nvPr>
+            <p:ph type="sldNum" sz="quarter" idx="5"/>
+          </p:nvPr>
+        </p:nvSpPr>
+        <p:spPr>
+          <a:xfrm>
+            <a:off x="3884613" y="8685213"/>
+            <a:ext cx="2971800" cy="458787"/>
+          </a:xfrm>
+          <a:prstGeom prst="rect">
+            <a:avLst/>
+          </a:prstGeom>
+        </p:spPr>
+        <p:txBody>
+          <a:bodyPr vert="horz" lIns="91440" tIns="45720" rIns="91440" bIns="45720" rtlCol="0" anchor="b"/>
+          <a:lstStyle>
+            <a:lvl1pPr algn="r">
+              <a:defRPr sz="1200"/>
+            </a:lvl1pPr>
+          </a:lstStyle>
+          <a:p>
+            <a:fld id="{42B846AA-FC4B-A04F-88EB-B0C153C26622}" type="slidenum">
+              <a:rPr lang="en-US" smtClean="0"/>
+              <a:t>‹#›</a:t>
+            </a:fld>
+            <a:endParaRPr lang="en-US"/>
+          </a:p>
+        </p:txBody>
+      </p:sp>
+    </p:spTree>
+    <p:extLst>
+      <p:ext uri="{BB962C8B-B14F-4D97-AF65-F5344CB8AC3E}">
+        <p14:creationId xmlns:p14="http://schemas.microsoft.com/office/powerpoint/2010/main" val="3823951261"/>
+      </p:ext>
+    </p:extLst>
+  </p:cSld>
+  <p:clrMap bg1="lt1" tx1="dk1" bg2="lt2" tx2="dk2" accent1="accent1" accent2="accent2" accent3="accent3" accent4="accent4" accent5="accent5" accent6="accent6" hlink="hlink" folHlink="folHlink"/>
+  <p:notesStyle>
+    <a:lvl1pPr marL="0" algn="l" defTabSz="914400" rtl="0" eaLnBrk="1" latinLnBrk="0" hangingPunct="1">
+      <a:defRPr sz="1200" kern="1200">
+        <a:solidFill>
+          <a:schemeClr val="tx1"/>
+        </a:solidFill>
+        <a:latin typeface="+mn-lt"/>
+        <a:ea typeface="+mn-ea"/>
+        <a:cs typeface="+mn-cs"/>
+      </a:defRPr>
+    </a:lvl1pPr>
+    <a:lvl2pPr marL="457200" algn="l" defTabSz="914400" rtl="0" eaLnBrk="1" latinLnBrk="0" hangingPunct="1">
+      <a:defRPr sz="1200" kern="1200">
+        <a:solidFill>
+          <a:schemeClr val="tx1"/>
+        </a:solidFill>
+        <a:latin typeface="+mn-lt"/>
+        <a:ea typeface="+mn-ea"/>
+        <a:cs typeface="+mn-cs"/>
+      </a:defRPr>
+    </a:lvl2pPr>
+    <a:lvl3pPr marL="914400" algn="l" defTabSz="914400" rtl="0" eaLnBrk="1" latinLnBrk="0" hangingPunct="1">
+      <a:defRPr sz="1200" kern="1200">
+        <a:solidFill>
+          <a:schemeClr val="tx1"/>
+        </a:solidFill>
+        <a:latin typeface="+mn-lt"/>
+        <a:ea typeface="+mn-ea"/>
+        <a:cs typeface="+mn-cs"/>
+      </a:defRPr>
+    </a:lvl3pPr>
+    <a:lvl4pPr marL="1371600" algn="l" defTabSz="914400" rtl="0" eaLnBrk="1" latinLnBrk="0" hangingPunct="1">
+      <a:defRPr sz="1200" kern="1200">
+        <a:solidFill>
+          <a:schemeClr val="tx1"/>
+        </a:solidFill>
+        <a:latin typeface="+mn-lt"/>
+        <a:ea typeface="+mn-ea"/>
+        <a:cs typeface="+mn-cs"/>
+      </a:defRPr>
+    </a:lvl4pPr>
+    <a:lvl5pPr marL="1828800" algn="l" defTabSz="914400" rtl="0" eaLnBrk="1" latinLnBrk="0" hangingPunct="1">
+      <a:defRPr sz="1200" kern="1200">
+        <a:solidFill>
+          <a:schemeClr val="tx1"/>
+        </a:solidFill>
+        <a:latin typeface="+mn-lt"/>
+        <a:ea typeface="+mn-ea"/>
+        <a:cs typeface="+mn-cs"/>
+      </a:defRPr>
+    </a:lvl5pPr>
+    <a:lvl6pPr marL="2286000" algn="l" defTabSz="914400" rtl="0" eaLnBrk="1" latinLnBrk="0" hangingPunct="1">
+      <a:defRPr sz="1200" kern="1200">
+        <a:solidFill>
+          <a:schemeClr val="tx1"/>
+        </a:solidFill>
+        <a:latin typeface="+mn-lt"/>
+        <a:ea typeface="+mn-ea"/>
+        <a:cs typeface="+mn-cs"/>
+      </a:defRPr>
+    </a:lvl6pPr>
+    <a:lvl7pPr marL="2743200" algn="l" defTabSz="914400" rtl="0" eaLnBrk="1" latinLnBrk="0" hangingPunct="1">
+      <a:defRPr sz="1200" kern="1200">
+        <a:solidFill>
+          <a:schemeClr val="tx1"/>
+        </a:solidFill>
+        <a:latin typeface="+mn-lt"/>
+        <a:ea typeface="+mn-ea"/>
+        <a:cs typeface="+mn-cs"/>
+      </a:defRPr>
+    </a:lvl7pPr>
+    <a:lvl8pPr marL="3200400" algn="l" defTabSz="914400" rtl="0" eaLnBrk="1" latinLnBrk="0" hangingPunct="1">
+      <a:defRPr sz="1200" kern="1200">
+        <a:solidFill>
+          <a:schemeClr val="tx1"/>
+        </a:solidFill>
+        <a:latin typeface="+mn-lt"/>
+        <a:ea typeface="+mn-ea"/>
+        <a:cs typeface="+mn-cs"/>
+      </a:defRPr>
+    </a:lvl8pPr>
+    <a:lvl9pPr marL="3657600" algn="l" defTabSz="914400" rtl="0" eaLnBrk="1" latinLnBrk="0" hangingPunct="1">
+      <a:defRPr sz="1200" kern="1200">
+        <a:solidFill>
+          <a:schemeClr val="tx1"/>
+        </a:solidFill>
+        <a:latin typeface="+mn-lt"/>
+        <a:ea typeface="+mn-ea"/>
+        <a:cs typeface="+mn-cs"/>
+      </a:defRPr>
+    </a:lvl9pPr>
+  </p:notesStyle>
+</p:notesMaster>
+</file>
+
+<file path=ppt/notesSlides/notesSlide1.xml><?xml version="1.0" encoding="utf-8"?>
+<p:notes xmlns:a="http://schemas.openxmlformats.org/drawingml/2006/main" xmlns:r="http://schemas.openxmlformats.org/officeDocument/2006/relationships" xmlns:p="http://schemas.openxmlformats.org/presentationml/2006/main">
+  <p:cSld>
+    <p:spTree>
+      <p:nvGrpSpPr>
+        <p:cNvPr id="1" name=""/>
+        <p:cNvGrpSpPr/>
+        <p:nvPr/>
+      </p:nvGrpSpPr>
+      <p:grpSpPr>
+        <a:xfrm>
+          <a:off x="0" y="0"/>
+          <a:ext cx="0" cy="0"/>
+          <a:chOff x="0" y="0"/>
+          <a:chExt cx="0" cy="0"/>
+        </a:xfrm>
+      </p:grpSpPr>
+      <p:sp>
+        <p:nvSpPr>
+          <p:cNvPr id="2" name="Slide Image Placeholder 1"/>
+          <p:cNvSpPr>
+            <a:spLocks noGrp="1" noRot="1" noChangeAspect="1"/>
+          </p:cNvSpPr>
+          <p:nvPr>
+            <p:ph type="sldImg"/>
+          </p:nvPr>
+        </p:nvSpPr>
+        <p:spPr/>
+      </p:sp>
+      <p:sp>
+        <p:nvSpPr>
+          <p:cNvPr id="3" name="Notes Placeholder 2"/>
+          <p:cNvSpPr>
+            <a:spLocks noGrp="1"/>
+          </p:cNvSpPr>
+          <p:nvPr>
+            <p:ph type="body" idx="1"/>
+          </p:nvPr>
+        </p:nvSpPr>
+        <p:spPr/>
+        <p:txBody>
+          <a:bodyPr/>
+          <a:lstStyle/>
+          <a:p>
+            <a:r>
+              <a:rPr lang="en-US" dirty="0"/>
+              <a:t>Comparison of 2014 &amp; 2015 data show that extremely cold, ice-covered periods in 2015 promote benthic nitrate depletion. The proceeding two thaw events in 2015 were minor and cold meltwater failed to promote mixing in the bay by skimming across the surface of the bay. Would need to show temperature and oxygen profiles.</a:t>
+            </a:r>
+          </a:p>
+        </p:txBody>
+      </p:sp>
+      <p:sp>
+        <p:nvSpPr>
+          <p:cNvPr id="4" name="Slide Number Placeholder 3"/>
+          <p:cNvSpPr>
+            <a:spLocks noGrp="1"/>
+          </p:cNvSpPr>
+          <p:nvPr>
+            <p:ph type="sldNum" sz="quarter" idx="5"/>
+          </p:nvPr>
+        </p:nvSpPr>
+        <p:spPr/>
+        <p:txBody>
+          <a:bodyPr/>
+          <a:lstStyle/>
+          <a:p>
+            <a:fld id="{42B846AA-FC4B-A04F-88EB-B0C153C26622}" type="slidenum">
+              <a:rPr lang="en-US" smtClean="0"/>
+              <a:t>1</a:t>
+            </a:fld>
+            <a:endParaRPr lang="en-US"/>
+          </a:p>
+        </p:txBody>
+      </p:sp>
+    </p:spTree>
+    <p:extLst>
+      <p:ext uri="{BB962C8B-B14F-4D97-AF65-F5344CB8AC3E}">
+        <p14:creationId xmlns:p14="http://schemas.microsoft.com/office/powerpoint/2010/main" val="511578050"/>
+      </p:ext>
+    </p:extLst>
+  </p:cSld>
+  <p:clrMapOvr>
+    <a:masterClrMapping/>
+  </p:clrMapOvr>
+</p:notes>
 </file>
 
 <file path=ppt/slideLayouts/slideLayout1.xml><?xml version="1.0" encoding="utf-8"?>
@@ -148,10 +603,9 @@
           <a:lstStyle/>
           <a:p>
             <a:r>
-              <a:rPr lang="en-US" smtClean="0"/>
+              <a:rPr lang="en-US"/>
               <a:t>Click to edit Master title style</a:t>
             </a:r>
-            <a:endParaRPr lang="en-US"/>
           </a:p>
         </p:txBody>
       </p:sp>
@@ -267,10 +721,9 @@
           </a:lstStyle>
           <a:p>
             <a:r>
-              <a:rPr lang="en-US" smtClean="0"/>
+              <a:rPr lang="en-US"/>
               <a:t>Click to edit Master subtitle style</a:t>
             </a:r>
-            <a:endParaRPr lang="en-US"/>
           </a:p>
         </p:txBody>
       </p:sp>
@@ -291,7 +744,7 @@
           <a:p>
             <a:fld id="{229F9254-BB35-7742-B6B6-8314049D96F5}" type="datetimeFigureOut">
               <a:rPr lang="en-US" smtClean="0"/>
-              <a:t>7/4/18</a:t>
+              <a:t>9/10/18</a:t>
             </a:fld>
             <a:endParaRPr lang="en-US"/>
           </a:p>
@@ -385,10 +838,9 @@
           <a:lstStyle/>
           <a:p>
             <a:r>
-              <a:rPr lang="en-US" smtClean="0"/>
+              <a:rPr lang="en-US"/>
               <a:t>Click to edit Master title style</a:t>
             </a:r>
-            <a:endParaRPr lang="en-US"/>
           </a:p>
         </p:txBody>
       </p:sp>
@@ -409,38 +861,37 @@
           <a:p>
             <a:pPr lvl="0"/>
             <a:r>
-              <a:rPr lang="en-US" smtClean="0"/>
+              <a:rPr lang="en-US"/>
               <a:t>Click to edit Master text styles</a:t>
             </a:r>
           </a:p>
           <a:p>
             <a:pPr lvl="1"/>
             <a:r>
-              <a:rPr lang="en-US" smtClean="0"/>
+              <a:rPr lang="en-US"/>
               <a:t>Second level</a:t>
             </a:r>
           </a:p>
           <a:p>
             <a:pPr lvl="2"/>
             <a:r>
-              <a:rPr lang="en-US" smtClean="0"/>
+              <a:rPr lang="en-US"/>
               <a:t>Third level</a:t>
             </a:r>
           </a:p>
           <a:p>
             <a:pPr lvl="3"/>
             <a:r>
-              <a:rPr lang="en-US" smtClean="0"/>
+              <a:rPr lang="en-US"/>
               <a:t>Fourth level</a:t>
             </a:r>
           </a:p>
           <a:p>
             <a:pPr lvl="4"/>
             <a:r>
-              <a:rPr lang="en-US" smtClean="0"/>
+              <a:rPr lang="en-US"/>
               <a:t>Fifth level</a:t>
             </a:r>
-            <a:endParaRPr lang="en-US"/>
           </a:p>
         </p:txBody>
       </p:sp>
@@ -461,7 +912,7 @@
           <a:p>
             <a:fld id="{229F9254-BB35-7742-B6B6-8314049D96F5}" type="datetimeFigureOut">
               <a:rPr lang="en-US" smtClean="0"/>
-              <a:t>7/4/18</a:t>
+              <a:t>9/10/18</a:t>
             </a:fld>
             <a:endParaRPr lang="en-US"/>
           </a:p>
@@ -560,10 +1011,9 @@
           <a:lstStyle/>
           <a:p>
             <a:r>
-              <a:rPr lang="en-US" smtClean="0"/>
+              <a:rPr lang="en-US"/>
               <a:t>Click to edit Master title style</a:t>
             </a:r>
-            <a:endParaRPr lang="en-US"/>
           </a:p>
         </p:txBody>
       </p:sp>
@@ -589,38 +1039,37 @@
           <a:p>
             <a:pPr lvl="0"/>
             <a:r>
-              <a:rPr lang="en-US" smtClean="0"/>
+              <a:rPr lang="en-US"/>
               <a:t>Click to edit Master text styles</a:t>
             </a:r>
           </a:p>
           <a:p>
             <a:pPr lvl="1"/>
             <a:r>
-              <a:rPr lang="en-US" smtClean="0"/>
+              <a:rPr lang="en-US"/>
               <a:t>Second level</a:t>
             </a:r>
           </a:p>
           <a:p>
             <a:pPr lvl="2"/>
             <a:r>
-              <a:rPr lang="en-US" smtClean="0"/>
+              <a:rPr lang="en-US"/>
               <a:t>Third level</a:t>
             </a:r>
           </a:p>
           <a:p>
             <a:pPr lvl="3"/>
             <a:r>
-              <a:rPr lang="en-US" smtClean="0"/>
+              <a:rPr lang="en-US"/>
               <a:t>Fourth level</a:t>
             </a:r>
           </a:p>
           <a:p>
             <a:pPr lvl="4"/>
             <a:r>
-              <a:rPr lang="en-US" smtClean="0"/>
+              <a:rPr lang="en-US"/>
               <a:t>Fifth level</a:t>
             </a:r>
-            <a:endParaRPr lang="en-US"/>
           </a:p>
         </p:txBody>
       </p:sp>
@@ -641,7 +1090,7 @@
           <a:p>
             <a:fld id="{229F9254-BB35-7742-B6B6-8314049D96F5}" type="datetimeFigureOut">
               <a:rPr lang="en-US" smtClean="0"/>
-              <a:t>7/4/18</a:t>
+              <a:t>9/10/18</a:t>
             </a:fld>
             <a:endParaRPr lang="en-US"/>
           </a:p>
@@ -735,10 +1184,9 @@
           <a:lstStyle/>
           <a:p>
             <a:r>
-              <a:rPr lang="en-US" smtClean="0"/>
+              <a:rPr lang="en-US"/>
               <a:t>Click to edit Master title style</a:t>
             </a:r>
-            <a:endParaRPr lang="en-US"/>
           </a:p>
         </p:txBody>
       </p:sp>
@@ -759,38 +1207,37 @@
           <a:p>
             <a:pPr lvl="0"/>
             <a:r>
-              <a:rPr lang="en-US" smtClean="0"/>
+              <a:rPr lang="en-US"/>
               <a:t>Click to edit Master text styles</a:t>
             </a:r>
           </a:p>
           <a:p>
             <a:pPr lvl="1"/>
             <a:r>
-              <a:rPr lang="en-US" smtClean="0"/>
+              <a:rPr lang="en-US"/>
               <a:t>Second level</a:t>
             </a:r>
           </a:p>
           <a:p>
             <a:pPr lvl="2"/>
             <a:r>
-              <a:rPr lang="en-US" smtClean="0"/>
+              <a:rPr lang="en-US"/>
               <a:t>Third level</a:t>
             </a:r>
           </a:p>
           <a:p>
             <a:pPr lvl="3"/>
             <a:r>
-              <a:rPr lang="en-US" smtClean="0"/>
+              <a:rPr lang="en-US"/>
               <a:t>Fourth level</a:t>
             </a:r>
           </a:p>
           <a:p>
             <a:pPr lvl="4"/>
             <a:r>
-              <a:rPr lang="en-US" smtClean="0"/>
+              <a:rPr lang="en-US"/>
               <a:t>Fifth level</a:t>
             </a:r>
-            <a:endParaRPr lang="en-US"/>
           </a:p>
         </p:txBody>
       </p:sp>
@@ -811,7 +1258,7 @@
           <a:p>
             <a:fld id="{229F9254-BB35-7742-B6B6-8314049D96F5}" type="datetimeFigureOut">
               <a:rPr lang="en-US" smtClean="0"/>
-              <a:t>7/4/18</a:t>
+              <a:t>9/10/18</a:t>
             </a:fld>
             <a:endParaRPr lang="en-US"/>
           </a:p>
@@ -914,10 +1361,9 @@
           </a:lstStyle>
           <a:p>
             <a:r>
-              <a:rPr lang="en-US" smtClean="0"/>
+              <a:rPr lang="en-US"/>
               <a:t>Click to edit Master title style</a:t>
             </a:r>
-            <a:endParaRPr lang="en-US"/>
           </a:p>
         </p:txBody>
       </p:sp>
@@ -1034,7 +1480,7 @@
           <a:p>
             <a:pPr lvl="0"/>
             <a:r>
-              <a:rPr lang="en-US" smtClean="0"/>
+              <a:rPr lang="en-US"/>
               <a:t>Click to edit Master text styles</a:t>
             </a:r>
           </a:p>
@@ -1057,7 +1503,7 @@
           <a:p>
             <a:fld id="{229F9254-BB35-7742-B6B6-8314049D96F5}" type="datetimeFigureOut">
               <a:rPr lang="en-US" smtClean="0"/>
-              <a:t>7/4/18</a:t>
+              <a:t>9/10/18</a:t>
             </a:fld>
             <a:endParaRPr lang="en-US"/>
           </a:p>
@@ -1151,10 +1597,9 @@
           <a:lstStyle/>
           <a:p>
             <a:r>
-              <a:rPr lang="en-US" smtClean="0"/>
+              <a:rPr lang="en-US"/>
               <a:t>Click to edit Master title style</a:t>
             </a:r>
-            <a:endParaRPr lang="en-US"/>
           </a:p>
         </p:txBody>
       </p:sp>
@@ -1208,38 +1653,37 @@
           <a:p>
             <a:pPr lvl="0"/>
             <a:r>
-              <a:rPr lang="en-US" smtClean="0"/>
+              <a:rPr lang="en-US"/>
               <a:t>Click to edit Master text styles</a:t>
             </a:r>
           </a:p>
           <a:p>
             <a:pPr lvl="1"/>
             <a:r>
-              <a:rPr lang="en-US" smtClean="0"/>
+              <a:rPr lang="en-US"/>
               <a:t>Second level</a:t>
             </a:r>
           </a:p>
           <a:p>
             <a:pPr lvl="2"/>
             <a:r>
-              <a:rPr lang="en-US" smtClean="0"/>
+              <a:rPr lang="en-US"/>
               <a:t>Third level</a:t>
             </a:r>
           </a:p>
           <a:p>
             <a:pPr lvl="3"/>
             <a:r>
-              <a:rPr lang="en-US" smtClean="0"/>
+              <a:rPr lang="en-US"/>
               <a:t>Fourth level</a:t>
             </a:r>
           </a:p>
           <a:p>
             <a:pPr lvl="4"/>
             <a:r>
-              <a:rPr lang="en-US" smtClean="0"/>
+              <a:rPr lang="en-US"/>
               <a:t>Fifth level</a:t>
             </a:r>
-            <a:endParaRPr lang="en-US"/>
           </a:p>
         </p:txBody>
       </p:sp>
@@ -1293,38 +1737,37 @@
           <a:p>
             <a:pPr lvl="0"/>
             <a:r>
-              <a:rPr lang="en-US" smtClean="0"/>
+              <a:rPr lang="en-US"/>
               <a:t>Click to edit Master text styles</a:t>
             </a:r>
           </a:p>
           <a:p>
             <a:pPr lvl="1"/>
             <a:r>
-              <a:rPr lang="en-US" smtClean="0"/>
+              <a:rPr lang="en-US"/>
               <a:t>Second level</a:t>
             </a:r>
           </a:p>
           <a:p>
             <a:pPr lvl="2"/>
             <a:r>
-              <a:rPr lang="en-US" smtClean="0"/>
+              <a:rPr lang="en-US"/>
               <a:t>Third level</a:t>
             </a:r>
           </a:p>
           <a:p>
             <a:pPr lvl="3"/>
             <a:r>
-              <a:rPr lang="en-US" smtClean="0"/>
+              <a:rPr lang="en-US"/>
               <a:t>Fourth level</a:t>
             </a:r>
           </a:p>
           <a:p>
             <a:pPr lvl="4"/>
             <a:r>
-              <a:rPr lang="en-US" smtClean="0"/>
+              <a:rPr lang="en-US"/>
               <a:t>Fifth level</a:t>
             </a:r>
-            <a:endParaRPr lang="en-US"/>
           </a:p>
         </p:txBody>
       </p:sp>
@@ -1345,7 +1788,7 @@
           <a:p>
             <a:fld id="{229F9254-BB35-7742-B6B6-8314049D96F5}" type="datetimeFigureOut">
               <a:rPr lang="en-US" smtClean="0"/>
-              <a:t>7/4/18</a:t>
+              <a:t>9/10/18</a:t>
             </a:fld>
             <a:endParaRPr lang="en-US"/>
           </a:p>
@@ -1443,10 +1886,9 @@
           </a:lstStyle>
           <a:p>
             <a:r>
-              <a:rPr lang="en-US" smtClean="0"/>
+              <a:rPr lang="en-US"/>
               <a:t>Click to edit Master title style</a:t>
             </a:r>
-            <a:endParaRPr lang="en-US"/>
           </a:p>
         </p:txBody>
       </p:sp>
@@ -1509,7 +1951,7 @@
           <a:p>
             <a:pPr lvl="0"/>
             <a:r>
-              <a:rPr lang="en-US" smtClean="0"/>
+              <a:rPr lang="en-US"/>
               <a:t>Click to edit Master text styles</a:t>
             </a:r>
           </a:p>
@@ -1565,38 +2007,37 @@
           <a:p>
             <a:pPr lvl="0"/>
             <a:r>
-              <a:rPr lang="en-US" smtClean="0"/>
+              <a:rPr lang="en-US"/>
               <a:t>Click to edit Master text styles</a:t>
             </a:r>
           </a:p>
           <a:p>
             <a:pPr lvl="1"/>
             <a:r>
-              <a:rPr lang="en-US" smtClean="0"/>
+              <a:rPr lang="en-US"/>
               <a:t>Second level</a:t>
             </a:r>
           </a:p>
           <a:p>
             <a:pPr lvl="2"/>
             <a:r>
-              <a:rPr lang="en-US" smtClean="0"/>
+              <a:rPr lang="en-US"/>
               <a:t>Third level</a:t>
             </a:r>
           </a:p>
           <a:p>
             <a:pPr lvl="3"/>
             <a:r>
-              <a:rPr lang="en-US" smtClean="0"/>
+              <a:rPr lang="en-US"/>
               <a:t>Fourth level</a:t>
             </a:r>
           </a:p>
           <a:p>
             <a:pPr lvl="4"/>
             <a:r>
-              <a:rPr lang="en-US" smtClean="0"/>
+              <a:rPr lang="en-US"/>
               <a:t>Fifth level</a:t>
             </a:r>
-            <a:endParaRPr lang="en-US"/>
           </a:p>
         </p:txBody>
       </p:sp>
@@ -1659,7 +2100,7 @@
           <a:p>
             <a:pPr lvl="0"/>
             <a:r>
-              <a:rPr lang="en-US" smtClean="0"/>
+              <a:rPr lang="en-US"/>
               <a:t>Click to edit Master text styles</a:t>
             </a:r>
           </a:p>
@@ -1715,38 +2156,37 @@
           <a:p>
             <a:pPr lvl="0"/>
             <a:r>
-              <a:rPr lang="en-US" smtClean="0"/>
+              <a:rPr lang="en-US"/>
               <a:t>Click to edit Master text styles</a:t>
             </a:r>
           </a:p>
           <a:p>
             <a:pPr lvl="1"/>
             <a:r>
-              <a:rPr lang="en-US" smtClean="0"/>
+              <a:rPr lang="en-US"/>
               <a:t>Second level</a:t>
             </a:r>
           </a:p>
           <a:p>
             <a:pPr lvl="2"/>
             <a:r>
-              <a:rPr lang="en-US" smtClean="0"/>
+              <a:rPr lang="en-US"/>
               <a:t>Third level</a:t>
             </a:r>
           </a:p>
           <a:p>
             <a:pPr lvl="3"/>
             <a:r>
-              <a:rPr lang="en-US" smtClean="0"/>
+              <a:rPr lang="en-US"/>
               <a:t>Fourth level</a:t>
             </a:r>
           </a:p>
           <a:p>
             <a:pPr lvl="4"/>
             <a:r>
-              <a:rPr lang="en-US" smtClean="0"/>
+              <a:rPr lang="en-US"/>
               <a:t>Fifth level</a:t>
             </a:r>
-            <a:endParaRPr lang="en-US"/>
           </a:p>
         </p:txBody>
       </p:sp>
@@ -1767,7 +2207,7 @@
           <a:p>
             <a:fld id="{229F9254-BB35-7742-B6B6-8314049D96F5}" type="datetimeFigureOut">
               <a:rPr lang="en-US" smtClean="0"/>
-              <a:t>7/4/18</a:t>
+              <a:t>9/10/18</a:t>
             </a:fld>
             <a:endParaRPr lang="en-US"/>
           </a:p>
@@ -1861,10 +2301,9 @@
           <a:lstStyle/>
           <a:p>
             <a:r>
-              <a:rPr lang="en-US" smtClean="0"/>
+              <a:rPr lang="en-US"/>
               <a:t>Click to edit Master title style</a:t>
             </a:r>
-            <a:endParaRPr lang="en-US"/>
           </a:p>
         </p:txBody>
       </p:sp>
@@ -1885,7 +2324,7 @@
           <a:p>
             <a:fld id="{229F9254-BB35-7742-B6B6-8314049D96F5}" type="datetimeFigureOut">
               <a:rPr lang="en-US" smtClean="0"/>
-              <a:t>7/4/18</a:t>
+              <a:t>9/10/18</a:t>
             </a:fld>
             <a:endParaRPr lang="en-US"/>
           </a:p>
@@ -1980,7 +2419,7 @@
           <a:p>
             <a:fld id="{229F9254-BB35-7742-B6B6-8314049D96F5}" type="datetimeFigureOut">
               <a:rPr lang="en-US" smtClean="0"/>
-              <a:t>7/4/18</a:t>
+              <a:t>9/10/18</a:t>
             </a:fld>
             <a:endParaRPr lang="en-US"/>
           </a:p>
@@ -2083,10 +2522,9 @@
           </a:lstStyle>
           <a:p>
             <a:r>
-              <a:rPr lang="en-US" smtClean="0"/>
+              <a:rPr lang="en-US"/>
               <a:t>Click to edit Master title style</a:t>
             </a:r>
-            <a:endParaRPr lang="en-US"/>
           </a:p>
         </p:txBody>
       </p:sp>
@@ -2140,38 +2578,37 @@
           <a:p>
             <a:pPr lvl="0"/>
             <a:r>
-              <a:rPr lang="en-US" smtClean="0"/>
+              <a:rPr lang="en-US"/>
               <a:t>Click to edit Master text styles</a:t>
             </a:r>
           </a:p>
           <a:p>
             <a:pPr lvl="1"/>
             <a:r>
-              <a:rPr lang="en-US" smtClean="0"/>
+              <a:rPr lang="en-US"/>
               <a:t>Second level</a:t>
             </a:r>
           </a:p>
           <a:p>
             <a:pPr lvl="2"/>
             <a:r>
-              <a:rPr lang="en-US" smtClean="0"/>
+              <a:rPr lang="en-US"/>
               <a:t>Third level</a:t>
             </a:r>
           </a:p>
           <a:p>
             <a:pPr lvl="3"/>
             <a:r>
-              <a:rPr lang="en-US" smtClean="0"/>
+              <a:rPr lang="en-US"/>
               <a:t>Fourth level</a:t>
             </a:r>
           </a:p>
           <a:p>
             <a:pPr lvl="4"/>
             <a:r>
-              <a:rPr lang="en-US" smtClean="0"/>
+              <a:rPr lang="en-US"/>
               <a:t>Fifth level</a:t>
             </a:r>
-            <a:endParaRPr lang="en-US"/>
           </a:p>
         </p:txBody>
       </p:sp>
@@ -2234,7 +2671,7 @@
           <a:p>
             <a:pPr lvl="0"/>
             <a:r>
-              <a:rPr lang="en-US" smtClean="0"/>
+              <a:rPr lang="en-US"/>
               <a:t>Click to edit Master text styles</a:t>
             </a:r>
           </a:p>
@@ -2257,7 +2694,7 @@
           <a:p>
             <a:fld id="{229F9254-BB35-7742-B6B6-8314049D96F5}" type="datetimeFigureOut">
               <a:rPr lang="en-US" smtClean="0"/>
-              <a:t>7/4/18</a:t>
+              <a:t>9/10/18</a:t>
             </a:fld>
             <a:endParaRPr lang="en-US"/>
           </a:p>
@@ -2360,10 +2797,9 @@
           </a:lstStyle>
           <a:p>
             <a:r>
-              <a:rPr lang="en-US" smtClean="0"/>
+              <a:rPr lang="en-US"/>
               <a:t>Click to edit Master title style</a:t>
             </a:r>
-            <a:endParaRPr lang="en-US"/>
           </a:p>
         </p:txBody>
       </p:sp>
@@ -2487,7 +2923,7 @@
           <a:p>
             <a:pPr lvl="0"/>
             <a:r>
-              <a:rPr lang="en-US" smtClean="0"/>
+              <a:rPr lang="en-US"/>
               <a:t>Click to edit Master text styles</a:t>
             </a:r>
           </a:p>
@@ -2510,7 +2946,7 @@
           <a:p>
             <a:fld id="{229F9254-BB35-7742-B6B6-8314049D96F5}" type="datetimeFigureOut">
               <a:rPr lang="en-US" smtClean="0"/>
-              <a:t>7/4/18</a:t>
+              <a:t>9/10/18</a:t>
             </a:fld>
             <a:endParaRPr lang="en-US"/>
           </a:p>
@@ -2619,10 +3055,9 @@
           <a:lstStyle/>
           <a:p>
             <a:r>
-              <a:rPr lang="en-US" smtClean="0"/>
+              <a:rPr lang="en-US"/>
               <a:t>Click to edit Master title style</a:t>
             </a:r>
-            <a:endParaRPr lang="en-US"/>
           </a:p>
         </p:txBody>
       </p:sp>
@@ -2653,38 +3088,37 @@
           <a:p>
             <a:pPr lvl="0"/>
             <a:r>
-              <a:rPr lang="en-US" smtClean="0"/>
+              <a:rPr lang="en-US"/>
               <a:t>Click to edit Master text styles</a:t>
             </a:r>
           </a:p>
           <a:p>
             <a:pPr lvl="1"/>
             <a:r>
-              <a:rPr lang="en-US" smtClean="0"/>
+              <a:rPr lang="en-US"/>
               <a:t>Second level</a:t>
             </a:r>
           </a:p>
           <a:p>
             <a:pPr lvl="2"/>
             <a:r>
-              <a:rPr lang="en-US" smtClean="0"/>
+              <a:rPr lang="en-US"/>
               <a:t>Third level</a:t>
             </a:r>
           </a:p>
           <a:p>
             <a:pPr lvl="3"/>
             <a:r>
-              <a:rPr lang="en-US" smtClean="0"/>
+              <a:rPr lang="en-US"/>
               <a:t>Fourth level</a:t>
             </a:r>
           </a:p>
           <a:p>
             <a:pPr lvl="4"/>
             <a:r>
-              <a:rPr lang="en-US" smtClean="0"/>
+              <a:rPr lang="en-US"/>
               <a:t>Fifth level</a:t>
             </a:r>
-            <a:endParaRPr lang="en-US"/>
           </a:p>
         </p:txBody>
       </p:sp>
@@ -2723,7 +3157,7 @@
           <a:p>
             <a:fld id="{229F9254-BB35-7742-B6B6-8314049D96F5}" type="datetimeFigureOut">
               <a:rPr lang="en-US" smtClean="0"/>
-              <a:t>7/4/18</a:t>
+              <a:t>9/10/18</a:t>
             </a:fld>
             <a:endParaRPr lang="en-US"/>
           </a:p>
@@ -3107,7 +3541,7 @@
           <p:nvPr/>
         </p:nvPicPr>
         <p:blipFill>
-          <a:blip r:embed="rId2">
+          <a:blip r:embed="rId3">
             <a:extLst>
               <a:ext uri="{28A0092B-C50C-407E-A947-70E740481C1C}">
                 <a14:useLocalDpi xmlns:a14="http://schemas.microsoft.com/office/drawing/2010/main" val="0"/>
@@ -3259,10 +3693,9 @@
           <a:lstStyle/>
           <a:p>
             <a:r>
-              <a:rPr lang="en-US" dirty="0" smtClean="0"/>
+              <a:rPr lang="en-US" dirty="0"/>
               <a:t>Frozen</a:t>
             </a:r>
-            <a:endParaRPr lang="en-US" dirty="0"/>
           </a:p>
         </p:txBody>
       </p:sp>
@@ -3289,10 +3722,9 @@
           <a:lstStyle/>
           <a:p>
             <a:r>
-              <a:rPr lang="en-US" dirty="0" smtClean="0"/>
+              <a:rPr lang="en-US" dirty="0"/>
               <a:t>Thaw</a:t>
             </a:r>
-            <a:endParaRPr lang="en-US" dirty="0"/>
           </a:p>
         </p:txBody>
       </p:sp>
@@ -3439,7 +3871,7 @@
           <p:nvPr/>
         </p:nvPicPr>
         <p:blipFill>
-          <a:blip r:embed="rId3">
+          <a:blip r:embed="rId4">
             <a:extLst>
               <a:ext uri="{28A0092B-C50C-407E-A947-70E740481C1C}">
                 <a14:useLocalDpi xmlns:a14="http://schemas.microsoft.com/office/drawing/2010/main" val="0"/>
@@ -3483,22 +3915,21 @@
           <a:lstStyle/>
           <a:p>
             <a:r>
-              <a:rPr lang="en-US" dirty="0" err="1" smtClean="0"/>
+              <a:rPr lang="en-US" dirty="0" err="1"/>
               <a:t>Missisquoi</a:t>
             </a:r>
             <a:r>
-              <a:rPr lang="en-US" dirty="0" smtClean="0"/>
+              <a:rPr lang="en-US" dirty="0"/>
               <a:t> Bay </a:t>
             </a:r>
             <a:r>
-              <a:rPr lang="mr-IN" dirty="0" smtClean="0"/>
+              <a:rPr lang="mr-IN" dirty="0"/>
               <a:t>–</a:t>
             </a:r>
             <a:r>
-              <a:rPr lang="en-US" dirty="0" smtClean="0"/>
+              <a:rPr lang="en-US" dirty="0"/>
               <a:t> Winter 2014 &amp; 2015 Comparison - Nitrogen</a:t>
             </a:r>
-            <a:endParaRPr lang="en-US" dirty="0"/>
           </a:p>
         </p:txBody>
       </p:sp>
@@ -3651,22 +4082,21 @@
           <a:lstStyle/>
           <a:p>
             <a:r>
-              <a:rPr lang="en-US" dirty="0" err="1" smtClean="0"/>
+              <a:rPr lang="en-US" dirty="0" err="1"/>
               <a:t>Missisquoi</a:t>
             </a:r>
             <a:r>
-              <a:rPr lang="en-US" dirty="0" smtClean="0"/>
+              <a:rPr lang="en-US" dirty="0"/>
               <a:t> Bay </a:t>
             </a:r>
             <a:r>
-              <a:rPr lang="mr-IN" dirty="0" smtClean="0"/>
+              <a:rPr lang="mr-IN" dirty="0"/>
               <a:t>–</a:t>
             </a:r>
             <a:r>
-              <a:rPr lang="en-US" dirty="0" smtClean="0"/>
+              <a:rPr lang="en-US" dirty="0"/>
               <a:t> each panel is a different sampling day; dashed lines are thaw events</a:t>
             </a:r>
-            <a:endParaRPr lang="en-US" dirty="0"/>
           </a:p>
         </p:txBody>
       </p:sp>
@@ -3693,10 +4123,9 @@
           <a:lstStyle/>
           <a:p>
             <a:r>
-              <a:rPr lang="en-US" dirty="0" smtClean="0"/>
+              <a:rPr lang="en-US" dirty="0"/>
               <a:t>Shelburne Pond</a:t>
             </a:r>
-            <a:endParaRPr lang="en-US" dirty="0"/>
           </a:p>
         </p:txBody>
       </p:sp>
@@ -3831,10 +4260,9 @@
           <a:lstStyle/>
           <a:p>
             <a:r>
-              <a:rPr lang="en-US" dirty="0" smtClean="0"/>
+              <a:rPr lang="en-US" dirty="0"/>
               <a:t>Frozen</a:t>
             </a:r>
-            <a:endParaRPr lang="en-US" dirty="0"/>
           </a:p>
         </p:txBody>
       </p:sp>
@@ -3861,10 +4289,9 @@
           <a:lstStyle/>
           <a:p>
             <a:r>
-              <a:rPr lang="en-US" dirty="0" smtClean="0"/>
+              <a:rPr lang="en-US" dirty="0"/>
               <a:t>Thaw</a:t>
             </a:r>
-            <a:endParaRPr lang="en-US" dirty="0"/>
           </a:p>
         </p:txBody>
       </p:sp>
@@ -4056,10 +4483,9 @@
           <a:p>
             <a:pPr algn="ctr"/>
             <a:r>
-              <a:rPr lang="en-US" dirty="0" smtClean="0"/>
+              <a:rPr lang="en-US" dirty="0"/>
               <a:t>2014</a:t>
             </a:r>
-            <a:endParaRPr lang="en-US" dirty="0"/>
           </a:p>
         </p:txBody>
       </p:sp>
@@ -4086,10 +4512,9 @@
           <a:lstStyle/>
           <a:p>
             <a:r>
-              <a:rPr lang="en-US" sz="1200" dirty="0" smtClean="0"/>
+              <a:rPr lang="en-US" sz="1200" dirty="0"/>
               <a:t>Same data over time and grouped by depth (D1 = top, D5 = bottom)</a:t>
             </a:r>
-            <a:endParaRPr lang="en-US" sz="1200" dirty="0"/>
           </a:p>
         </p:txBody>
       </p:sp>
@@ -4116,22 +4541,21 @@
           <a:lstStyle/>
           <a:p>
             <a:r>
-              <a:rPr lang="en-US" dirty="0" err="1" smtClean="0"/>
+              <a:rPr lang="en-US" dirty="0" err="1"/>
               <a:t>Missisquoi</a:t>
             </a:r>
             <a:r>
-              <a:rPr lang="en-US" dirty="0" smtClean="0"/>
+              <a:rPr lang="en-US" dirty="0"/>
               <a:t> Bay </a:t>
             </a:r>
             <a:r>
-              <a:rPr lang="mr-IN" dirty="0" smtClean="0"/>
+              <a:rPr lang="mr-IN" dirty="0"/>
               <a:t>–</a:t>
             </a:r>
             <a:r>
-              <a:rPr lang="en-US" dirty="0" smtClean="0"/>
+              <a:rPr lang="en-US" dirty="0"/>
               <a:t> Winter 2014 &amp; 2015 Comparison - Nitrogen</a:t>
             </a:r>
-            <a:endParaRPr lang="en-US" dirty="0"/>
           </a:p>
         </p:txBody>
       </p:sp>
@@ -4219,10 +4643,9 @@
           <a:p>
             <a:pPr algn="ctr"/>
             <a:r>
-              <a:rPr lang="en-US" dirty="0" smtClean="0"/>
+              <a:rPr lang="en-US" dirty="0"/>
               <a:t>2015</a:t>
             </a:r>
-            <a:endParaRPr lang="en-US" dirty="0"/>
           </a:p>
         </p:txBody>
       </p:sp>
@@ -4340,7 +4763,7 @@
           <a:p>
             <a:pPr algn="ctr"/>
             <a:r>
-              <a:rPr lang="en-US" dirty="0" err="1" smtClean="0"/>
+              <a:rPr lang="en-US" dirty="0" err="1"/>
               <a:t>Missisquoi</a:t>
             </a:r>
             <a:endParaRPr lang="en-US" dirty="0"/>
@@ -4371,10 +4794,9 @@
           <a:p>
             <a:pPr algn="ctr"/>
             <a:r>
-              <a:rPr lang="en-US" dirty="0" smtClean="0"/>
+              <a:rPr lang="en-US" dirty="0"/>
               <a:t>Shelburne</a:t>
             </a:r>
-            <a:endParaRPr lang="en-US" dirty="0"/>
           </a:p>
         </p:txBody>
       </p:sp>
@@ -4401,10 +4823,9 @@
           <a:lstStyle/>
           <a:p>
             <a:r>
-              <a:rPr lang="en-US" dirty="0" smtClean="0"/>
+              <a:rPr lang="en-US" dirty="0"/>
               <a:t>Same data over time and grouped by depth (D1 = top, D5 = bottom)</a:t>
             </a:r>
-            <a:endParaRPr lang="en-US" dirty="0"/>
           </a:p>
         </p:txBody>
       </p:sp>
@@ -4739,4 +5160,299 @@
   </a:objectDefaults>
   <a:extraClrSchemeLst/>
 </a:theme>
+</file>
+
+<file path=ppt/theme/theme2.xml><?xml version="1.0" encoding="utf-8"?>
+<a:theme xmlns:a="http://schemas.openxmlformats.org/drawingml/2006/main" name="Office Theme">
+  <a:themeElements>
+    <a:clrScheme name="Office">
+      <a:dk1>
+        <a:sysClr val="windowText" lastClr="000000"/>
+      </a:dk1>
+      <a:lt1>
+        <a:sysClr val="window" lastClr="FFFFFF"/>
+      </a:lt1>
+      <a:dk2>
+        <a:srgbClr val="44546A"/>
+      </a:dk2>
+      <a:lt2>
+        <a:srgbClr val="E7E6E6"/>
+      </a:lt2>
+      <a:accent1>
+        <a:srgbClr val="4472C4"/>
+      </a:accent1>
+      <a:accent2>
+        <a:srgbClr val="ED7D31"/>
+      </a:accent2>
+      <a:accent3>
+        <a:srgbClr val="A5A5A5"/>
+      </a:accent3>
+      <a:accent4>
+        <a:srgbClr val="FFC000"/>
+      </a:accent4>
+      <a:accent5>
+        <a:srgbClr val="5B9BD5"/>
+      </a:accent5>
+      <a:accent6>
+        <a:srgbClr val="70AD47"/>
+      </a:accent6>
+      <a:hlink>
+        <a:srgbClr val="0563C1"/>
+      </a:hlink>
+      <a:folHlink>
+        <a:srgbClr val="954F72"/>
+      </a:folHlink>
+    </a:clrScheme>
+    <a:fontScheme name="Office">
+      <a:majorFont>
+        <a:latin typeface="Calibri Light" panose="020F0302020204030204"/>
+        <a:ea typeface=""/>
+        <a:cs typeface=""/>
+        <a:font script="Jpan" typeface="游ゴシック Light"/>
+        <a:font script="Hang" typeface="맑은 고딕"/>
+        <a:font script="Hans" typeface="等线 Light"/>
+        <a:font script="Hant" typeface="新細明體"/>
+        <a:font script="Arab" typeface="Times New Roman"/>
+        <a:font script="Hebr" typeface="Times New Roman"/>
+        <a:font script="Thai" typeface="Angsana New"/>
+        <a:font script="Ethi" typeface="Nyala"/>
+        <a:font script="Beng" typeface="Vrinda"/>
+        <a:font script="Gujr" typeface="Shruti"/>
+        <a:font script="Khmr" typeface="MoolBoran"/>
+        <a:font script="Knda" typeface="Tunga"/>
+        <a:font script="Guru" typeface="Raavi"/>
+        <a:font script="Cans" typeface="Euphemia"/>
+        <a:font script="Cher" typeface="Plantagenet Cherokee"/>
+        <a:font script="Yiii" typeface="Microsoft Yi Baiti"/>
+        <a:font script="Tibt" typeface="Microsoft Himalaya"/>
+        <a:font script="Thaa" typeface="MV Boli"/>
+        <a:font script="Deva" typeface="Mangal"/>
+        <a:font script="Telu" typeface="Gautami"/>
+        <a:font script="Taml" typeface="Latha"/>
+        <a:font script="Syrc" typeface="Estrangelo Edessa"/>
+        <a:font script="Orya" typeface="Kalinga"/>
+        <a:font script="Mlym" typeface="Kartika"/>
+        <a:font script="Laoo" typeface="DokChampa"/>
+        <a:font script="Sinh" typeface="Iskoola Pota"/>
+        <a:font script="Mong" typeface="Mongolian Baiti"/>
+        <a:font script="Viet" typeface="Times New Roman"/>
+        <a:font script="Uigh" typeface="Microsoft Uighur"/>
+        <a:font script="Geor" typeface="Sylfaen"/>
+        <a:font script="Armn" typeface="Arial"/>
+        <a:font script="Bugi" typeface="Leelawadee UI"/>
+        <a:font script="Bopo" typeface="Microsoft JhengHei"/>
+        <a:font script="Java" typeface="Javanese Text"/>
+        <a:font script="Lisu" typeface="Segoe UI"/>
+        <a:font script="Mymr" typeface="Myanmar Text"/>
+        <a:font script="Nkoo" typeface="Ebrima"/>
+        <a:font script="Olck" typeface="Nirmala UI"/>
+        <a:font script="Osma" typeface="Ebrima"/>
+        <a:font script="Phag" typeface="Phagspa"/>
+        <a:font script="Syrn" typeface="Estrangelo Edessa"/>
+        <a:font script="Syrj" typeface="Estrangelo Edessa"/>
+        <a:font script="Syre" typeface="Estrangelo Edessa"/>
+        <a:font script="Sora" typeface="Nirmala UI"/>
+        <a:font script="Tale" typeface="Microsoft Tai Le"/>
+        <a:font script="Talu" typeface="Microsoft New Tai Lue"/>
+        <a:font script="Tfng" typeface="Ebrima"/>
+      </a:majorFont>
+      <a:minorFont>
+        <a:latin typeface="Calibri" panose="020F0502020204030204"/>
+        <a:ea typeface=""/>
+        <a:cs typeface=""/>
+        <a:font script="Jpan" typeface="游ゴシック"/>
+        <a:font script="Hang" typeface="맑은 고딕"/>
+        <a:font script="Hans" typeface="等线"/>
+        <a:font script="Hant" typeface="新細明體"/>
+        <a:font script="Arab" typeface="Arial"/>
+        <a:font script="Hebr" typeface="Arial"/>
+        <a:font script="Thai" typeface="Cordia New"/>
+        <a:font script="Ethi" typeface="Nyala"/>
+        <a:font script="Beng" typeface="Vrinda"/>
+        <a:font script="Gujr" typeface="Shruti"/>
+        <a:font script="Khmr" typeface="DaunPenh"/>
+        <a:font script="Knda" typeface="Tunga"/>
+        <a:font script="Guru" typeface="Raavi"/>
+        <a:font script="Cans" typeface="Euphemia"/>
+        <a:font script="Cher" typeface="Plantagenet Cherokee"/>
+        <a:font script="Yiii" typeface="Microsoft Yi Baiti"/>
+        <a:font script="Tibt" typeface="Microsoft Himalaya"/>
+        <a:font script="Thaa" typeface="MV Boli"/>
+        <a:font script="Deva" typeface="Mangal"/>
+        <a:font script="Telu" typeface="Gautami"/>
+        <a:font script="Taml" typeface="Latha"/>
+        <a:font script="Syrc" typeface="Estrangelo Edessa"/>
+        <a:font script="Orya" typeface="Kalinga"/>
+        <a:font script="Mlym" typeface="Kartika"/>
+        <a:font script="Laoo" typeface="DokChampa"/>
+        <a:font script="Sinh" typeface="Iskoola Pota"/>
+        <a:font script="Mong" typeface="Mongolian Baiti"/>
+        <a:font script="Viet" typeface="Arial"/>
+        <a:font script="Uigh" typeface="Microsoft Uighur"/>
+        <a:font script="Geor" typeface="Sylfaen"/>
+        <a:font script="Armn" typeface="Arial"/>
+        <a:font script="Bugi" typeface="Leelawadee UI"/>
+        <a:font script="Bopo" typeface="Microsoft JhengHei"/>
+        <a:font script="Java" typeface="Javanese Text"/>
+        <a:font script="Lisu" typeface="Segoe UI"/>
+        <a:font script="Mymr" typeface="Myanmar Text"/>
+        <a:font script="Nkoo" typeface="Ebrima"/>
+        <a:font script="Olck" typeface="Nirmala UI"/>
+        <a:font script="Osma" typeface="Ebrima"/>
+        <a:font script="Phag" typeface="Phagspa"/>
+        <a:font script="Syrn" typeface="Estrangelo Edessa"/>
+        <a:font script="Syrj" typeface="Estrangelo Edessa"/>
+        <a:font script="Syre" typeface="Estrangelo Edessa"/>
+        <a:font script="Sora" typeface="Nirmala UI"/>
+        <a:font script="Tale" typeface="Microsoft Tai Le"/>
+        <a:font script="Talu" typeface="Microsoft New Tai Lue"/>
+        <a:font script="Tfng" typeface="Ebrima"/>
+      </a:minorFont>
+    </a:fontScheme>
+    <a:fmtScheme name="Office">
+      <a:fillStyleLst>
+        <a:solidFill>
+          <a:schemeClr val="phClr"/>
+        </a:solidFill>
+        <a:gradFill rotWithShape="1">
+          <a:gsLst>
+            <a:gs pos="0">
+              <a:schemeClr val="phClr">
+                <a:lumMod val="110000"/>
+                <a:satMod val="105000"/>
+                <a:tint val="67000"/>
+              </a:schemeClr>
+            </a:gs>
+            <a:gs pos="50000">
+              <a:schemeClr val="phClr">
+                <a:lumMod val="105000"/>
+                <a:satMod val="103000"/>
+                <a:tint val="73000"/>
+              </a:schemeClr>
+            </a:gs>
+            <a:gs pos="100000">
+              <a:schemeClr val="phClr">
+                <a:lumMod val="105000"/>
+                <a:satMod val="109000"/>
+                <a:tint val="81000"/>
+              </a:schemeClr>
+            </a:gs>
+          </a:gsLst>
+          <a:lin ang="5400000" scaled="0"/>
+        </a:gradFill>
+        <a:gradFill rotWithShape="1">
+          <a:gsLst>
+            <a:gs pos="0">
+              <a:schemeClr val="phClr">
+                <a:satMod val="103000"/>
+                <a:lumMod val="102000"/>
+                <a:tint val="94000"/>
+              </a:schemeClr>
+            </a:gs>
+            <a:gs pos="50000">
+              <a:schemeClr val="phClr">
+                <a:satMod val="110000"/>
+                <a:lumMod val="100000"/>
+                <a:shade val="100000"/>
+              </a:schemeClr>
+            </a:gs>
+            <a:gs pos="100000">
+              <a:schemeClr val="phClr">
+                <a:lumMod val="99000"/>
+                <a:satMod val="120000"/>
+                <a:shade val="78000"/>
+              </a:schemeClr>
+            </a:gs>
+          </a:gsLst>
+          <a:lin ang="5400000" scaled="0"/>
+        </a:gradFill>
+      </a:fillStyleLst>
+      <a:lnStyleLst>
+        <a:ln w="6350" cap="flat" cmpd="sng" algn="ctr">
+          <a:solidFill>
+            <a:schemeClr val="phClr"/>
+          </a:solidFill>
+          <a:prstDash val="solid"/>
+          <a:miter lim="800000"/>
+        </a:ln>
+        <a:ln w="12700" cap="flat" cmpd="sng" algn="ctr">
+          <a:solidFill>
+            <a:schemeClr val="phClr"/>
+          </a:solidFill>
+          <a:prstDash val="solid"/>
+          <a:miter lim="800000"/>
+        </a:ln>
+        <a:ln w="19050" cap="flat" cmpd="sng" algn="ctr">
+          <a:solidFill>
+            <a:schemeClr val="phClr"/>
+          </a:solidFill>
+          <a:prstDash val="solid"/>
+          <a:miter lim="800000"/>
+        </a:ln>
+      </a:lnStyleLst>
+      <a:effectStyleLst>
+        <a:effectStyle>
+          <a:effectLst/>
+        </a:effectStyle>
+        <a:effectStyle>
+          <a:effectLst/>
+        </a:effectStyle>
+        <a:effectStyle>
+          <a:effectLst>
+            <a:outerShdw blurRad="57150" dist="19050" dir="5400000" algn="ctr" rotWithShape="0">
+              <a:srgbClr val="000000">
+                <a:alpha val="63000"/>
+              </a:srgbClr>
+            </a:outerShdw>
+          </a:effectLst>
+        </a:effectStyle>
+      </a:effectStyleLst>
+      <a:bgFillStyleLst>
+        <a:solidFill>
+          <a:schemeClr val="phClr"/>
+        </a:solidFill>
+        <a:solidFill>
+          <a:schemeClr val="phClr">
+            <a:tint val="95000"/>
+            <a:satMod val="170000"/>
+          </a:schemeClr>
+        </a:solidFill>
+        <a:gradFill rotWithShape="1">
+          <a:gsLst>
+            <a:gs pos="0">
+              <a:schemeClr val="phClr">
+                <a:tint val="93000"/>
+                <a:satMod val="150000"/>
+                <a:shade val="98000"/>
+                <a:lumMod val="102000"/>
+              </a:schemeClr>
+            </a:gs>
+            <a:gs pos="50000">
+              <a:schemeClr val="phClr">
+                <a:tint val="98000"/>
+                <a:satMod val="130000"/>
+                <a:shade val="90000"/>
+                <a:lumMod val="103000"/>
+              </a:schemeClr>
+            </a:gs>
+            <a:gs pos="100000">
+              <a:schemeClr val="phClr">
+                <a:shade val="63000"/>
+                <a:satMod val="120000"/>
+              </a:schemeClr>
+            </a:gs>
+          </a:gsLst>
+          <a:lin ang="5400000" scaled="0"/>
+        </a:gradFill>
+      </a:bgFillStyleLst>
+    </a:fmtScheme>
+  </a:themeElements>
+  <a:objectDefaults/>
+  <a:extraClrSchemeLst/>
+  <a:extLst>
+    <a:ext uri="{05A4C25C-085E-4340-85A3-A5531E510DB2}">
+      <thm15:themeFamily xmlns:thm15="http://schemas.microsoft.com/office/thememl/2012/main" name="Office Theme" id="{62F939B6-93AF-4DB8-9C6B-D6C7DFDC589F}" vid="{4A3C46E8-61CC-4603-A589-7422A47A8E4A}"/>
+    </a:ext>
+  </a:extLst>
+</a:theme>
 </file>
</xml_diff>